<commit_message>
Report and Presentation For Project
</commit_message>
<xml_diff>
--- a/NilamHut.pptx
+++ b/NilamHut.pptx
@@ -7431,9 +7431,18 @@
   <p:clrMapOvr>
     <a:masterClrMapping/>
   </p:clrMapOvr>
-  <p:transition spd="slow">
-    <p:wipe/>
-  </p:transition>
+  <mc:AlternateContent xmlns:mc="http://schemas.openxmlformats.org/markup-compatibility/2006">
+    <mc:Choice xmlns:p14="http://schemas.microsoft.com/office/powerpoint/2010/main" Requires="p14">
+      <p:transition spd="med" p14:dur="700">
+        <p:fade/>
+      </p:transition>
+    </mc:Choice>
+    <mc:Fallback>
+      <p:transition spd="med">
+        <p:fade/>
+      </p:transition>
+    </mc:Fallback>
+  </mc:AlternateContent>
   <p:timing>
     <p:tnLst>
       <p:par>
@@ -7550,13 +7559,13 @@
   <p:clrMapOvr>
     <a:masterClrMapping/>
   </p:clrMapOvr>
-  <mc:AlternateContent xmlns:mc="http://schemas.openxmlformats.org/markup-compatibility/2006">
-    <mc:Choice xmlns:p14="http://schemas.microsoft.com/office/powerpoint/2010/main" Requires="p14">
+  <mc:AlternateContent xmlns:mc="http://schemas.openxmlformats.org/markup-compatibility/2006" xmlns:p14="http://schemas.microsoft.com/office/powerpoint/2010/main">
+    <mc:Choice Requires="p14">
       <p:transition spd="med" p14:dur="700">
         <p:fade/>
       </p:transition>
     </mc:Choice>
-    <mc:Fallback>
+    <mc:Fallback xmlns="">
       <p:transition spd="med">
         <p:fade/>
       </p:transition>
@@ -8745,14 +8754,14 @@
   <p:clrMapOvr>
     <a:masterClrMapping/>
   </p:clrMapOvr>
-  <mc:AlternateContent xmlns:mc="http://schemas.openxmlformats.org/markup-compatibility/2006" xmlns:p14="http://schemas.microsoft.com/office/powerpoint/2010/main">
-    <mc:Choice Requires="p14">
-      <p:transition spd="med" p14:dur="700">
-        <p:fade/>
+  <mc:AlternateContent xmlns:mc="http://schemas.openxmlformats.org/markup-compatibility/2006">
+    <mc:Choice xmlns:p15="http://schemas.microsoft.com/office/powerpoint/2012/main" Requires="p15">
+      <p:transition xmlns:p14="http://schemas.microsoft.com/office/powerpoint/2010/main" spd="slow" p14:dur="6000">
+        <p15:prstTrans prst="curtains"/>
       </p:transition>
     </mc:Choice>
-    <mc:Fallback xmlns="">
-      <p:transition spd="med">
+    <mc:Fallback>
+      <p:transition spd="slow">
         <p:fade/>
       </p:transition>
     </mc:Fallback>
@@ -8931,13 +8940,13 @@
   <p:clrMapOvr>
     <a:masterClrMapping/>
   </p:clrMapOvr>
-  <mc:AlternateContent xmlns:mc="http://schemas.openxmlformats.org/markup-compatibility/2006">
-    <mc:Choice xmlns:p14="http://schemas.microsoft.com/office/powerpoint/2010/main" Requires="p14">
+  <mc:AlternateContent xmlns:mc="http://schemas.openxmlformats.org/markup-compatibility/2006" xmlns:p14="http://schemas.microsoft.com/office/powerpoint/2010/main">
+    <mc:Choice Requires="p14">
       <p:transition spd="med" p14:dur="700">
         <p:fade/>
       </p:transition>
     </mc:Choice>
-    <mc:Fallback>
+    <mc:Fallback xmlns="">
       <p:transition spd="med">
         <p:fade/>
       </p:transition>
@@ -9669,13 +9678,13 @@
   <p:clrMapOvr>
     <a:masterClrMapping/>
   </p:clrMapOvr>
-  <mc:AlternateContent xmlns:mc="http://schemas.openxmlformats.org/markup-compatibility/2006">
-    <mc:Choice xmlns:p14="http://schemas.microsoft.com/office/powerpoint/2010/main" Requires="p14">
+  <mc:AlternateContent xmlns:mc="http://schemas.openxmlformats.org/markup-compatibility/2006" xmlns:p14="http://schemas.microsoft.com/office/powerpoint/2010/main">
+    <mc:Choice Requires="p14">
       <p:transition spd="med" p14:dur="700">
         <p:fade/>
       </p:transition>
     </mc:Choice>
-    <mc:Fallback>
+    <mc:Fallback xmlns="">
       <p:transition spd="med">
         <p:fade/>
       </p:transition>
@@ -10238,13 +10247,13 @@
   <p:clrMapOvr>
     <a:masterClrMapping/>
   </p:clrMapOvr>
-  <mc:AlternateContent xmlns:mc="http://schemas.openxmlformats.org/markup-compatibility/2006">
-    <mc:Choice xmlns:p14="http://schemas.microsoft.com/office/powerpoint/2010/main" Requires="p14">
+  <mc:AlternateContent xmlns:mc="http://schemas.openxmlformats.org/markup-compatibility/2006" xmlns:p14="http://schemas.microsoft.com/office/powerpoint/2010/main">
+    <mc:Choice Requires="p14">
       <p:transition spd="med" p14:dur="700">
         <p:fade/>
       </p:transition>
     </mc:Choice>
-    <mc:Fallback>
+    <mc:Fallback xmlns="">
       <p:transition spd="med">
         <p:fade/>
       </p:transition>
@@ -11233,13 +11242,13 @@
   <p:clrMapOvr>
     <a:masterClrMapping/>
   </p:clrMapOvr>
-  <mc:AlternateContent xmlns:mc="http://schemas.openxmlformats.org/markup-compatibility/2006">
-    <mc:Choice xmlns:p14="http://schemas.microsoft.com/office/powerpoint/2010/main" Requires="p14">
+  <mc:AlternateContent xmlns:mc="http://schemas.openxmlformats.org/markup-compatibility/2006" xmlns:p14="http://schemas.microsoft.com/office/powerpoint/2010/main">
+    <mc:Choice Requires="p14">
       <p:transition spd="med" p14:dur="700">
         <p:fade/>
       </p:transition>
     </mc:Choice>
-    <mc:Fallback>
+    <mc:Fallback xmlns="">
       <p:transition spd="med">
         <p:fade/>
       </p:transition>
@@ -12526,13 +12535,13 @@
   <p:clrMapOvr>
     <a:masterClrMapping/>
   </p:clrMapOvr>
-  <mc:AlternateContent xmlns:mc="http://schemas.openxmlformats.org/markup-compatibility/2006">
-    <mc:Choice xmlns:p14="http://schemas.microsoft.com/office/powerpoint/2010/main" Requires="p14">
+  <mc:AlternateContent xmlns:mc="http://schemas.openxmlformats.org/markup-compatibility/2006" xmlns:p14="http://schemas.microsoft.com/office/powerpoint/2010/main">
+    <mc:Choice Requires="p14">
       <p:transition spd="med" p14:dur="700">
         <p:fade/>
       </p:transition>
     </mc:Choice>
-    <mc:Fallback>
+    <mc:Fallback xmlns="">
       <p:transition spd="med">
         <p:fade/>
       </p:transition>
@@ -14112,13 +14121,13 @@
   <p:clrMapOvr>
     <a:masterClrMapping/>
   </p:clrMapOvr>
-  <mc:AlternateContent xmlns:mc="http://schemas.openxmlformats.org/markup-compatibility/2006">
-    <mc:Choice xmlns:p14="http://schemas.microsoft.com/office/powerpoint/2010/main" Requires="p14">
+  <mc:AlternateContent xmlns:mc="http://schemas.openxmlformats.org/markup-compatibility/2006" xmlns:p14="http://schemas.microsoft.com/office/powerpoint/2010/main">
+    <mc:Choice Requires="p14">
       <p:transition spd="med" p14:dur="700">
         <p:fade/>
       </p:transition>
     </mc:Choice>
-    <mc:Fallback>
+    <mc:Fallback xmlns="">
       <p:transition spd="med">
         <p:fade/>
       </p:transition>
@@ -14448,13 +14457,13 @@
   <p:clrMapOvr>
     <a:masterClrMapping/>
   </p:clrMapOvr>
-  <mc:AlternateContent xmlns:mc="http://schemas.openxmlformats.org/markup-compatibility/2006">
-    <mc:Choice xmlns:p14="http://schemas.microsoft.com/office/powerpoint/2010/main" Requires="p14">
+  <mc:AlternateContent xmlns:mc="http://schemas.openxmlformats.org/markup-compatibility/2006" xmlns:p14="http://schemas.microsoft.com/office/powerpoint/2010/main">
+    <mc:Choice Requires="p14">
       <p:transition spd="med" p14:dur="700">
         <p:fade/>
       </p:transition>
     </mc:Choice>
-    <mc:Fallback>
+    <mc:Fallback xmlns="">
       <p:transition spd="med">
         <p:fade/>
       </p:transition>

</xml_diff>